<commit_message>
add two styles of TDD into PPT
</commit_message>
<xml_diff>
--- a/Documents/TDD Hands-On 1 .pptx
+++ b/Documents/TDD Hands-On 1 .pptx
@@ -9,9 +9,13 @@
     <p:sldId id="257" r:id="rId3"/>
     <p:sldId id="258" r:id="rId4"/>
     <p:sldId id="261" r:id="rId5"/>
-    <p:sldId id="262" r:id="rId6"/>
+    <p:sldId id="263" r:id="rId6"/>
     <p:sldId id="259" r:id="rId7"/>
     <p:sldId id="260" r:id="rId8"/>
+    <p:sldId id="264" r:id="rId9"/>
+    <p:sldId id="266" r:id="rId10"/>
+    <p:sldId id="262" r:id="rId11"/>
+    <p:sldId id="265" r:id="rId12"/>
   </p:sldIdLst>
   <p:sldSz cx="9144000" cy="6858000" type="screen4x3"/>
   <p:notesSz cx="6858000" cy="9144000"/>
@@ -4686,7 +4690,7 @@
           <a:p>
             <a:fld id="{C989FEB5-2A31-4E33-8453-8B990C35E1EC}" type="datetimeFigureOut">
               <a:rPr lang="en-US" smtClean="0"/>
-              <a:t>6/5/2015</a:t>
+              <a:t>6/11/2015</a:t>
             </a:fld>
             <a:endParaRPr lang="en-US"/>
           </a:p>
@@ -4856,7 +4860,7 @@
           <a:p>
             <a:fld id="{C989FEB5-2A31-4E33-8453-8B990C35E1EC}" type="datetimeFigureOut">
               <a:rPr lang="en-US" smtClean="0"/>
-              <a:t>6/5/2015</a:t>
+              <a:t>6/11/2015</a:t>
             </a:fld>
             <a:endParaRPr lang="en-US"/>
           </a:p>
@@ -5036,7 +5040,7 @@
           <a:p>
             <a:fld id="{C989FEB5-2A31-4E33-8453-8B990C35E1EC}" type="datetimeFigureOut">
               <a:rPr lang="en-US" smtClean="0"/>
-              <a:t>6/5/2015</a:t>
+              <a:t>6/11/2015</a:t>
             </a:fld>
             <a:endParaRPr lang="en-US"/>
           </a:p>
@@ -5206,7 +5210,7 @@
           <a:p>
             <a:fld id="{C989FEB5-2A31-4E33-8453-8B990C35E1EC}" type="datetimeFigureOut">
               <a:rPr lang="en-US" smtClean="0"/>
-              <a:t>6/5/2015</a:t>
+              <a:t>6/11/2015</a:t>
             </a:fld>
             <a:endParaRPr lang="en-US"/>
           </a:p>
@@ -5452,7 +5456,7 @@
           <a:p>
             <a:fld id="{C989FEB5-2A31-4E33-8453-8B990C35E1EC}" type="datetimeFigureOut">
               <a:rPr lang="en-US" smtClean="0"/>
-              <a:t>6/5/2015</a:t>
+              <a:t>6/11/2015</a:t>
             </a:fld>
             <a:endParaRPr lang="en-US"/>
           </a:p>
@@ -5740,7 +5744,7 @@
           <a:p>
             <a:fld id="{C989FEB5-2A31-4E33-8453-8B990C35E1EC}" type="datetimeFigureOut">
               <a:rPr lang="en-US" smtClean="0"/>
-              <a:t>6/5/2015</a:t>
+              <a:t>6/11/2015</a:t>
             </a:fld>
             <a:endParaRPr lang="en-US"/>
           </a:p>
@@ -6162,7 +6166,7 @@
           <a:p>
             <a:fld id="{C989FEB5-2A31-4E33-8453-8B990C35E1EC}" type="datetimeFigureOut">
               <a:rPr lang="en-US" smtClean="0"/>
-              <a:t>6/5/2015</a:t>
+              <a:t>6/11/2015</a:t>
             </a:fld>
             <a:endParaRPr lang="en-US"/>
           </a:p>
@@ -6280,7 +6284,7 @@
           <a:p>
             <a:fld id="{C989FEB5-2A31-4E33-8453-8B990C35E1EC}" type="datetimeFigureOut">
               <a:rPr lang="en-US" smtClean="0"/>
-              <a:t>6/5/2015</a:t>
+              <a:t>6/11/2015</a:t>
             </a:fld>
             <a:endParaRPr lang="en-US"/>
           </a:p>
@@ -6375,7 +6379,7 @@
           <a:p>
             <a:fld id="{C989FEB5-2A31-4E33-8453-8B990C35E1EC}" type="datetimeFigureOut">
               <a:rPr lang="en-US" smtClean="0"/>
-              <a:t>6/5/2015</a:t>
+              <a:t>6/11/2015</a:t>
             </a:fld>
             <a:endParaRPr lang="en-US"/>
           </a:p>
@@ -6652,7 +6656,7 @@
           <a:p>
             <a:fld id="{C989FEB5-2A31-4E33-8453-8B990C35E1EC}" type="datetimeFigureOut">
               <a:rPr lang="en-US" smtClean="0"/>
-              <a:t>6/5/2015</a:t>
+              <a:t>6/11/2015</a:t>
             </a:fld>
             <a:endParaRPr lang="en-US"/>
           </a:p>
@@ -6905,7 +6909,7 @@
           <a:p>
             <a:fld id="{C989FEB5-2A31-4E33-8453-8B990C35E1EC}" type="datetimeFigureOut">
               <a:rPr lang="en-US" smtClean="0"/>
-              <a:t>6/5/2015</a:t>
+              <a:t>6/11/2015</a:t>
             </a:fld>
             <a:endParaRPr lang="en-US"/>
           </a:p>
@@ -7118,7 +7122,7 @@
           <a:p>
             <a:fld id="{C989FEB5-2A31-4E33-8453-8B990C35E1EC}" type="datetimeFigureOut">
               <a:rPr lang="en-US" smtClean="0"/>
-              <a:t>6/5/2015</a:t>
+              <a:t>6/11/2015</a:t>
             </a:fld>
             <a:endParaRPr lang="en-US"/>
           </a:p>
@@ -7555,6 +7559,376 @@
   <p:clrMapOvr>
     <a:masterClrMapping/>
   </p:clrMapOvr>
+  <p:timing>
+    <p:tnLst>
+      <p:par>
+        <p:cTn id="1" dur="indefinite" restart="never" nodeType="tmRoot"/>
+      </p:par>
+    </p:tnLst>
+  </p:timing>
+</p:sld>
+</file>
+
+<file path=ppt/slides/slide10.xml><?xml version="1.0" encoding="utf-8"?>
+<p:sld xmlns:a="http://schemas.openxmlformats.org/drawingml/2006/main" xmlns:r="http://schemas.openxmlformats.org/officeDocument/2006/relationships" xmlns:p="http://schemas.openxmlformats.org/presentationml/2006/main">
+  <p:cSld>
+    <p:spTree>
+      <p:nvGrpSpPr>
+        <p:cNvPr id="1" name=""/>
+        <p:cNvGrpSpPr/>
+        <p:nvPr/>
+      </p:nvGrpSpPr>
+      <p:grpSpPr>
+        <a:xfrm>
+          <a:off x="0" y="0"/>
+          <a:ext cx="0" cy="0"/>
+          <a:chOff x="0" y="0"/>
+          <a:chExt cx="0" cy="0"/>
+        </a:xfrm>
+      </p:grpSpPr>
+      <p:sp>
+        <p:nvSpPr>
+          <p:cNvPr id="2" name="TextBox 1"/>
+          <p:cNvSpPr txBox="1"/>
+          <p:nvPr/>
+        </p:nvSpPr>
+        <p:spPr>
+          <a:xfrm>
+            <a:off x="1752600" y="2209800"/>
+            <a:ext cx="5181483" cy="2431435"/>
+          </a:xfrm>
+          <a:prstGeom prst="rect">
+            <a:avLst/>
+          </a:prstGeom>
+          <a:noFill/>
+        </p:spPr>
+        <p:txBody>
+          <a:bodyPr wrap="none" rtlCol="0">
+            <a:spAutoFit/>
+          </a:bodyPr>
+          <a:lstStyle/>
+          <a:p>
+            <a:r>
+              <a:rPr lang="en-US" sz="4000" dirty="0" smtClean="0"/>
+              <a:t>TDD</a:t>
+            </a:r>
+            <a:r>
+              <a:rPr lang="en-US" sz="2800" dirty="0" smtClean="0"/>
+              <a:t> </a:t>
+            </a:r>
+            <a:r>
+              <a:rPr lang="en-US" sz="4000" dirty="0"/>
+              <a:t>is workflow</a:t>
+            </a:r>
+          </a:p>
+          <a:p>
+            <a:pPr marL="457200" indent="-457200">
+              <a:buFont typeface="Arial" panose="020B0604020202020204" pitchFamily="34" charset="0"/>
+              <a:buChar char="•"/>
+            </a:pPr>
+            <a:r>
+              <a:rPr lang="en-US" sz="2800" dirty="0" smtClean="0"/>
+              <a:t>Starts with </a:t>
+            </a:r>
+            <a:r>
+              <a:rPr lang="en-US" sz="2800" dirty="0" smtClean="0">
+                <a:solidFill>
+                  <a:srgbClr val="00B0F0"/>
+                </a:solidFill>
+              </a:rPr>
+              <a:t>confidence</a:t>
+            </a:r>
+          </a:p>
+          <a:p>
+            <a:pPr marL="457200" indent="-457200">
+              <a:buFont typeface="Arial" panose="020B0604020202020204" pitchFamily="34" charset="0"/>
+              <a:buChar char="•"/>
+            </a:pPr>
+            <a:r>
+              <a:rPr lang="en-US" sz="2800" dirty="0" smtClean="0"/>
+              <a:t>Deals with </a:t>
+            </a:r>
+            <a:r>
+              <a:rPr lang="en-US" sz="2800" dirty="0" smtClean="0">
+                <a:solidFill>
+                  <a:srgbClr val="FF0000"/>
+                </a:solidFill>
+              </a:rPr>
+              <a:t>specific</a:t>
+            </a:r>
+            <a:r>
+              <a:rPr lang="en-US" sz="2800" dirty="0" smtClean="0"/>
+              <a:t> </a:t>
+            </a:r>
+            <a:r>
+              <a:rPr lang="en-US" sz="2800" dirty="0" smtClean="0">
+                <a:sym typeface="Wingdings" panose="05000000000000000000" pitchFamily="2" charset="2"/>
+              </a:rPr>
+              <a:t>cases then</a:t>
+            </a:r>
+            <a:endParaRPr lang="en-US" sz="2800" dirty="0">
+              <a:sym typeface="Wingdings" panose="05000000000000000000" pitchFamily="2" charset="2"/>
+            </a:endParaRPr>
+          </a:p>
+          <a:p>
+            <a:pPr marL="914400" lvl="1" indent="-457200">
+              <a:buFont typeface="Arial" panose="020B0604020202020204" pitchFamily="34" charset="0"/>
+              <a:buChar char="•"/>
+            </a:pPr>
+            <a:r>
+              <a:rPr lang="en-US" sz="2800" dirty="0" smtClean="0">
+                <a:sym typeface="Wingdings" panose="05000000000000000000" pitchFamily="2" charset="2"/>
+              </a:rPr>
+              <a:t>Concludes </a:t>
+            </a:r>
+            <a:r>
+              <a:rPr lang="en-US" sz="2800" dirty="0" smtClean="0">
+                <a:solidFill>
+                  <a:srgbClr val="00B050"/>
+                </a:solidFill>
+                <a:sym typeface="Wingdings" panose="05000000000000000000" pitchFamily="2" charset="2"/>
+              </a:rPr>
+              <a:t>generic</a:t>
+            </a:r>
+            <a:r>
+              <a:rPr lang="en-US" sz="2800" dirty="0" smtClean="0">
+                <a:sym typeface="Wingdings" panose="05000000000000000000" pitchFamily="2" charset="2"/>
+              </a:rPr>
+              <a:t> cases</a:t>
+            </a:r>
+          </a:p>
+          <a:p>
+            <a:pPr marL="457200" indent="-457200">
+              <a:buFont typeface="Arial" panose="020B0604020202020204" pitchFamily="34" charset="0"/>
+              <a:buChar char="•"/>
+            </a:pPr>
+            <a:r>
+              <a:rPr lang="en-US" sz="2800" dirty="0" smtClean="0">
+                <a:sym typeface="Wingdings" panose="05000000000000000000" pitchFamily="2" charset="2"/>
+              </a:rPr>
+              <a:t>Prompts for code </a:t>
+            </a:r>
+            <a:r>
+              <a:rPr lang="en-US" sz="2800" dirty="0" smtClean="0">
+                <a:solidFill>
+                  <a:schemeClr val="accent6">
+                    <a:lumMod val="75000"/>
+                  </a:schemeClr>
+                </a:solidFill>
+                <a:sym typeface="Wingdings" panose="05000000000000000000" pitchFamily="2" charset="2"/>
+              </a:rPr>
+              <a:t>improvement</a:t>
+            </a:r>
+            <a:endParaRPr lang="en-US" sz="2800" dirty="0">
+              <a:solidFill>
+                <a:schemeClr val="accent6">
+                  <a:lumMod val="75000"/>
+                </a:schemeClr>
+              </a:solidFill>
+            </a:endParaRPr>
+          </a:p>
+        </p:txBody>
+      </p:sp>
+    </p:spTree>
+    <p:extLst>
+      <p:ext uri="{BB962C8B-B14F-4D97-AF65-F5344CB8AC3E}">
+        <p14:creationId xmlns:p14="http://schemas.microsoft.com/office/powerpoint/2010/main" val="3685412025"/>
+      </p:ext>
+    </p:extLst>
+  </p:cSld>
+  <p:clrMapOvr>
+    <a:masterClrMapping/>
+  </p:clrMapOvr>
+  <p:timing>
+    <p:tnLst>
+      <p:par>
+        <p:cTn id="1" dur="indefinite" restart="never" nodeType="tmRoot"/>
+      </p:par>
+    </p:tnLst>
+  </p:timing>
+</p:sld>
+</file>
+
+<file path=ppt/slides/slide11.xml><?xml version="1.0" encoding="utf-8"?>
+<p:sld xmlns:a="http://schemas.openxmlformats.org/drawingml/2006/main" xmlns:r="http://schemas.openxmlformats.org/officeDocument/2006/relationships" xmlns:p="http://schemas.openxmlformats.org/presentationml/2006/main">
+  <p:cSld>
+    <p:spTree>
+      <p:nvGrpSpPr>
+        <p:cNvPr id="1" name=""/>
+        <p:cNvGrpSpPr/>
+        <p:nvPr/>
+      </p:nvGrpSpPr>
+      <p:grpSpPr>
+        <a:xfrm>
+          <a:off x="0" y="0"/>
+          <a:ext cx="0" cy="0"/>
+          <a:chOff x="0" y="0"/>
+          <a:chExt cx="0" cy="0"/>
+        </a:xfrm>
+      </p:grpSpPr>
+      <p:sp>
+        <p:nvSpPr>
+          <p:cNvPr id="2" name="TextBox 1"/>
+          <p:cNvSpPr txBox="1"/>
+          <p:nvPr/>
+        </p:nvSpPr>
+        <p:spPr>
+          <a:xfrm>
+            <a:off x="3124200" y="1143000"/>
+            <a:ext cx="2022348" cy="584775"/>
+          </a:xfrm>
+          <a:prstGeom prst="rect">
+            <a:avLst/>
+          </a:prstGeom>
+          <a:noFill/>
+        </p:spPr>
+        <p:txBody>
+          <a:bodyPr wrap="none" rtlCol="0">
+            <a:spAutoFit/>
+          </a:bodyPr>
+          <a:lstStyle/>
+          <a:p>
+            <a:r>
+              <a:rPr lang="en-US" sz="3200" dirty="0" smtClean="0"/>
+              <a:t>Homework</a:t>
+            </a:r>
+            <a:endParaRPr lang="en-US" sz="3200" dirty="0"/>
+          </a:p>
+        </p:txBody>
+      </p:sp>
+      <p:sp>
+        <p:nvSpPr>
+          <p:cNvPr id="3" name="TextBox 2"/>
+          <p:cNvSpPr txBox="1"/>
+          <p:nvPr/>
+        </p:nvSpPr>
+        <p:spPr>
+          <a:xfrm>
+            <a:off x="914400" y="2133600"/>
+            <a:ext cx="5661806" cy="2031325"/>
+          </a:xfrm>
+          <a:prstGeom prst="rect">
+            <a:avLst/>
+          </a:prstGeom>
+          <a:noFill/>
+        </p:spPr>
+        <p:txBody>
+          <a:bodyPr wrap="none" rtlCol="0">
+            <a:spAutoFit/>
+          </a:bodyPr>
+          <a:lstStyle/>
+          <a:p>
+            <a:r>
+              <a:rPr lang="en-US" altLang="zh-CN" dirty="0" smtClean="0"/>
+              <a:t>Give number between 0 to 99, return its </a:t>
+            </a:r>
+            <a:r>
+              <a:rPr lang="en-US" altLang="zh-CN" dirty="0"/>
+              <a:t>E</a:t>
+            </a:r>
+            <a:r>
+              <a:rPr lang="en-US" altLang="zh-CN" dirty="0" smtClean="0"/>
+              <a:t>nglish word, E.g.</a:t>
+            </a:r>
+          </a:p>
+          <a:p>
+            <a:r>
+              <a:rPr lang="zh-CN" altLang="en-US" dirty="0" smtClean="0"/>
+              <a:t>给出任意个</a:t>
+            </a:r>
+            <a:r>
+              <a:rPr lang="en-US" altLang="zh-CN" dirty="0" smtClean="0"/>
+              <a:t>0-99</a:t>
+            </a:r>
+            <a:r>
+              <a:rPr lang="zh-CN" altLang="en-US" dirty="0" smtClean="0"/>
+              <a:t>的数字，返回数字的英文。比如</a:t>
+            </a:r>
+            <a:endParaRPr lang="en-US" altLang="zh-CN" dirty="0" smtClean="0"/>
+          </a:p>
+          <a:p>
+            <a:endParaRPr lang="en-US" dirty="0"/>
+          </a:p>
+          <a:p>
+            <a:r>
+              <a:rPr lang="en-US" dirty="0" smtClean="0"/>
+              <a:t>0 </a:t>
+            </a:r>
+            <a:r>
+              <a:rPr lang="en-US" dirty="0" smtClean="0">
+                <a:sym typeface="Wingdings" panose="05000000000000000000" pitchFamily="2" charset="2"/>
+              </a:rPr>
+              <a:t> </a:t>
+            </a:r>
+            <a:r>
+              <a:rPr lang="en-US" altLang="zh-CN" dirty="0" smtClean="0">
+                <a:sym typeface="Wingdings" panose="05000000000000000000" pitchFamily="2" charset="2"/>
+              </a:rPr>
+              <a:t>Zero</a:t>
+            </a:r>
+          </a:p>
+          <a:p>
+            <a:r>
+              <a:rPr lang="en-US" dirty="0" smtClean="0">
+                <a:sym typeface="Wingdings" panose="05000000000000000000" pitchFamily="2" charset="2"/>
+              </a:rPr>
+              <a:t>10  </a:t>
+            </a:r>
+            <a:r>
+              <a:rPr lang="en-US" altLang="zh-CN" dirty="0" smtClean="0">
+                <a:sym typeface="Wingdings" panose="05000000000000000000" pitchFamily="2" charset="2"/>
+              </a:rPr>
+              <a:t>Ten</a:t>
+            </a:r>
+          </a:p>
+          <a:p>
+            <a:r>
+              <a:rPr lang="en-US" dirty="0" smtClean="0">
+                <a:sym typeface="Wingdings" panose="05000000000000000000" pitchFamily="2" charset="2"/>
+              </a:rPr>
+              <a:t>21  </a:t>
+            </a:r>
+            <a:r>
+              <a:rPr lang="en-US" altLang="zh-CN" dirty="0" smtClean="0">
+                <a:sym typeface="Wingdings" panose="05000000000000000000" pitchFamily="2" charset="2"/>
+              </a:rPr>
+              <a:t>Twenty One</a:t>
+            </a:r>
+          </a:p>
+          <a:p>
+            <a:r>
+              <a:rPr lang="en-US" dirty="0" smtClean="0">
+                <a:sym typeface="Wingdings" panose="05000000000000000000" pitchFamily="2" charset="2"/>
+              </a:rPr>
+              <a:t>99  </a:t>
+            </a:r>
+            <a:r>
+              <a:rPr lang="en-US" altLang="zh-CN" dirty="0" smtClean="0">
+                <a:sym typeface="Wingdings" panose="05000000000000000000" pitchFamily="2" charset="2"/>
+              </a:rPr>
+              <a:t>Ninety Nine</a:t>
+            </a:r>
+            <a:endParaRPr lang="en-US" dirty="0"/>
+          </a:p>
+        </p:txBody>
+      </p:sp>
+    </p:spTree>
+    <p:extLst>
+      <p:ext uri="{BB962C8B-B14F-4D97-AF65-F5344CB8AC3E}">
+        <p14:creationId xmlns:p14="http://schemas.microsoft.com/office/powerpoint/2010/main" val="2195504767"/>
+      </p:ext>
+    </p:extLst>
+  </p:cSld>
+  <p:clrMapOvr>
+    <a:masterClrMapping/>
+  </p:clrMapOvr>
+  <p:timing>
+    <p:tnLst>
+      <p:par>
+        <p:cTn id="1" dur="indefinite" restart="never" nodeType="tmRoot"/>
+      </p:par>
+    </p:tnLst>
+  </p:timing>
 </p:sld>
 </file>
 
@@ -7637,6 +8011,13 @@
   <p:clrMapOvr>
     <a:masterClrMapping/>
   </p:clrMapOvr>
+  <p:timing>
+    <p:tnLst>
+      <p:par>
+        <p:cTn id="1" dur="indefinite" restart="never" nodeType="tmRoot"/>
+      </p:par>
+    </p:tnLst>
+  </p:timing>
 </p:sld>
 </file>
 
@@ -7782,6 +8163,13 @@
   <p:clrMapOvr>
     <a:masterClrMapping/>
   </p:clrMapOvr>
+  <p:timing>
+    <p:tnLst>
+      <p:par>
+        <p:cTn id="1" dur="indefinite" restart="never" nodeType="tmRoot"/>
+      </p:par>
+    </p:tnLst>
+  </p:timing>
 </p:sld>
 </file>
 
@@ -7887,6 +8275,13 @@
   <p:clrMapOvr>
     <a:masterClrMapping/>
   </p:clrMapOvr>
+  <p:timing>
+    <p:tnLst>
+      <p:par>
+        <p:cTn id="1" dur="indefinite" restart="never" nodeType="tmRoot"/>
+      </p:par>
+    </p:tnLst>
+  </p:timing>
 </p:sld>
 </file>
 
@@ -7909,124 +8304,201 @@
       </p:grpSpPr>
       <p:sp>
         <p:nvSpPr>
-          <p:cNvPr id="2" name="TextBox 1"/>
-          <p:cNvSpPr txBox="1"/>
+          <p:cNvPr id="2" name="Text Box 2"/>
+          <p:cNvSpPr txBox="1">
+            <a:spLocks noChangeArrowheads="1"/>
+          </p:cNvSpPr>
           <p:nvPr/>
         </p:nvSpPr>
-        <p:spPr>
+        <p:spPr bwMode="auto">
           <a:xfrm>
-            <a:off x="1752600" y="2209800"/>
-            <a:ext cx="4957063" cy="2000548"/>
+            <a:off x="685800" y="990600"/>
+            <a:ext cx="6172200" cy="655638"/>
           </a:xfrm>
           <a:prstGeom prst="rect">
             <a:avLst/>
           </a:prstGeom>
           <a:noFill/>
+          <a:ln>
+            <a:noFill/>
+          </a:ln>
+          <a:extLst>
+            <a:ext uri="{909E8E84-426E-40DD-AFC4-6F175D3DCCD1}">
+              <a14:hiddenFill xmlns:a14="http://schemas.microsoft.com/office/drawing/2010/main">
+                <a:solidFill>
+                  <a:srgbClr val="FFFFFF"/>
+                </a:solidFill>
+              </a14:hiddenFill>
+            </a:ext>
+            <a:ext uri="{91240B29-F687-4F45-9708-019B960494DF}">
+              <a14:hiddenLine xmlns:a14="http://schemas.microsoft.com/office/drawing/2010/main" w="9525">
+                <a:solidFill>
+                  <a:srgbClr val="000000"/>
+                </a:solidFill>
+                <a:miter lim="800000"/>
+                <a:headEnd/>
+                <a:tailEnd/>
+              </a14:hiddenLine>
+            </a:ext>
+          </a:extLst>
         </p:spPr>
         <p:txBody>
-          <a:bodyPr wrap="none" rtlCol="0">
+          <a:bodyPr>
             <a:spAutoFit/>
           </a:bodyPr>
           <a:lstStyle/>
           <a:p>
             <a:r>
-              <a:rPr lang="en-US" sz="4000" dirty="0" smtClean="0"/>
-              <a:t>TDD</a:t>
-            </a:r>
-            <a:r>
-              <a:rPr lang="en-US" sz="2800" dirty="0" smtClean="0"/>
-              <a:t> </a:t>
-            </a:r>
-          </a:p>
-          <a:p>
-            <a:pPr marL="457200" indent="-457200">
-              <a:buFont typeface="Arial" panose="020B0604020202020204" pitchFamily="34" charset="0"/>
-              <a:buChar char="•"/>
-            </a:pPr>
-            <a:r>
-              <a:rPr lang="en-US" sz="2800" dirty="0" smtClean="0"/>
-              <a:t>Starts with </a:t>
-            </a:r>
-            <a:r>
-              <a:rPr lang="en-US" sz="2800" dirty="0" smtClean="0">
+              <a:rPr lang="zh-CN" altLang="en-US" sz="2800" dirty="0"/>
+              <a:t>Transformation Priority Premise (TPP)</a:t>
+            </a:r>
+          </a:p>
+          <a:p>
+            <a:r>
+              <a:rPr lang="en-US" altLang="en-US" sz="900" dirty="0">
+                <a:hlinkClick r:id="rId2"/>
+              </a:rPr>
+              <a:t>http://blog.8thlight.com/uncle-bob/2013/05/27/TheTransformationPriorityPremise.html</a:t>
+            </a:r>
+          </a:p>
+        </p:txBody>
+      </p:sp>
+      <p:sp>
+        <p:nvSpPr>
+          <p:cNvPr id="3" name="Text Box 3"/>
+          <p:cNvSpPr txBox="1">
+            <a:spLocks noChangeArrowheads="1"/>
+          </p:cNvSpPr>
+          <p:nvPr/>
+        </p:nvSpPr>
+        <p:spPr bwMode="auto">
+          <a:xfrm>
+            <a:off x="685800" y="1752600"/>
+            <a:ext cx="7926388" cy="3382963"/>
+          </a:xfrm>
+          <a:prstGeom prst="rect">
+            <a:avLst/>
+          </a:prstGeom>
+          <a:noFill/>
+          <a:ln>
+            <a:noFill/>
+          </a:ln>
+          <a:extLst>
+            <a:ext uri="{909E8E84-426E-40DD-AFC4-6F175D3DCCD1}">
+              <a14:hiddenFill xmlns:a14="http://schemas.microsoft.com/office/drawing/2010/main">
                 <a:solidFill>
-                  <a:srgbClr val="00B0F0"/>
+                  <a:srgbClr val="FFFFFF"/>
                 </a:solidFill>
-              </a:rPr>
-              <a:t>confidence</a:t>
-            </a:r>
-          </a:p>
-          <a:p>
-            <a:pPr marL="457200" indent="-457200">
-              <a:buFont typeface="Arial" panose="020B0604020202020204" pitchFamily="34" charset="0"/>
-              <a:buChar char="•"/>
-            </a:pPr>
-            <a:r>
-              <a:rPr lang="en-US" sz="2800" dirty="0" smtClean="0"/>
-              <a:t>Deals with </a:t>
-            </a:r>
-            <a:r>
-              <a:rPr lang="en-US" sz="2800" dirty="0" smtClean="0">
+              </a14:hiddenFill>
+            </a:ext>
+            <a:ext uri="{91240B29-F687-4F45-9708-019B960494DF}">
+              <a14:hiddenLine xmlns:a14="http://schemas.microsoft.com/office/drawing/2010/main" w="9525">
                 <a:solidFill>
-                  <a:srgbClr val="FF0000"/>
+                  <a:srgbClr val="000000"/>
                 </a:solidFill>
-              </a:rPr>
-              <a:t>specific</a:t>
-            </a:r>
-            <a:r>
-              <a:rPr lang="en-US" sz="2800" dirty="0" smtClean="0"/>
-              <a:t> </a:t>
-            </a:r>
-            <a:r>
-              <a:rPr lang="en-US" sz="2800" dirty="0" smtClean="0">
-                <a:sym typeface="Wingdings" panose="05000000000000000000" pitchFamily="2" charset="2"/>
-              </a:rPr>
-              <a:t>cases then</a:t>
-            </a:r>
-            <a:endParaRPr lang="en-US" sz="2800" dirty="0">
-              <a:sym typeface="Wingdings" panose="05000000000000000000" pitchFamily="2" charset="2"/>
-            </a:endParaRPr>
-          </a:p>
-          <a:p>
-            <a:pPr marL="914400" lvl="1" indent="-457200">
-              <a:buFont typeface="Arial" panose="020B0604020202020204" pitchFamily="34" charset="0"/>
-              <a:buChar char="•"/>
-            </a:pPr>
-            <a:r>
-              <a:rPr lang="en-US" sz="2800" dirty="0" smtClean="0">
-                <a:sym typeface="Wingdings" panose="05000000000000000000" pitchFamily="2" charset="2"/>
-              </a:rPr>
-              <a:t>Concludes </a:t>
-            </a:r>
-            <a:r>
-              <a:rPr lang="en-US" sz="2800" dirty="0" smtClean="0">
-                <a:solidFill>
-                  <a:srgbClr val="00B050"/>
-                </a:solidFill>
-                <a:sym typeface="Wingdings" panose="05000000000000000000" pitchFamily="2" charset="2"/>
-              </a:rPr>
-              <a:t>generic</a:t>
-            </a:r>
-            <a:r>
-              <a:rPr lang="en-US" sz="2800" dirty="0" smtClean="0">
-                <a:sym typeface="Wingdings" panose="05000000000000000000" pitchFamily="2" charset="2"/>
-              </a:rPr>
-              <a:t> cases</a:t>
-            </a:r>
-            <a:endParaRPr lang="en-US" sz="2800" dirty="0"/>
+                <a:miter lim="800000"/>
+                <a:headEnd/>
+                <a:tailEnd/>
+              </a14:hiddenLine>
+            </a:ext>
+          </a:extLst>
+        </p:spPr>
+        <p:txBody>
+          <a:bodyPr wrap="none">
+            <a:spAutoFit/>
+          </a:bodyPr>
+          <a:lstStyle/>
+          <a:p>
+            <a:r>
+              <a:rPr lang="en-US" altLang="zh-CN"/>
+              <a:t>• ({}–&gt;nil) no code at all-&gt;code that employs nil </a:t>
+            </a:r>
+          </a:p>
+          <a:p>
+            <a:r>
+              <a:rPr lang="en-US" altLang="zh-CN"/>
+              <a:t>• (nil-&gt;constant) </a:t>
+            </a:r>
+          </a:p>
+          <a:p>
+            <a:r>
+              <a:rPr lang="en-US" altLang="zh-CN"/>
+              <a:t>• (constant-&gt;constant+) a simple constant to a more complex constant </a:t>
+            </a:r>
+          </a:p>
+          <a:p>
+            <a:r>
+              <a:rPr lang="en-US" altLang="zh-CN"/>
+              <a:t>• (constant-&gt;scalar) replacing a constant with a variable or an argument </a:t>
+            </a:r>
+          </a:p>
+          <a:p>
+            <a:r>
+              <a:rPr lang="en-US" altLang="zh-CN"/>
+              <a:t>• (statement-&gt;statements) adding more unconditional statements. </a:t>
+            </a:r>
+          </a:p>
+          <a:p>
+            <a:r>
+              <a:rPr lang="en-US" altLang="zh-CN"/>
+              <a:t>• (unconditional-&gt;if) splitting the execution path </a:t>
+            </a:r>
+          </a:p>
+          <a:p>
+            <a:r>
+              <a:rPr lang="en-US" altLang="zh-CN"/>
+              <a:t>• (scalar-&gt;array) </a:t>
+            </a:r>
+          </a:p>
+          <a:p>
+            <a:r>
+              <a:rPr lang="en-US" altLang="zh-CN"/>
+              <a:t>• (array-&gt;container) </a:t>
+            </a:r>
+          </a:p>
+          <a:p>
+            <a:r>
+              <a:rPr lang="en-US" altLang="zh-CN"/>
+              <a:t>• (statement-&gt;recursion) </a:t>
+            </a:r>
+          </a:p>
+          <a:p>
+            <a:r>
+              <a:rPr lang="en-US" altLang="zh-CN"/>
+              <a:t>• (if-&gt;while) </a:t>
+            </a:r>
+          </a:p>
+          <a:p>
+            <a:r>
+              <a:rPr lang="en-US" altLang="zh-CN"/>
+              <a:t>• (expression-&gt;function) replacing an expression with a function or algorithm </a:t>
+            </a:r>
+          </a:p>
+          <a:p>
+            <a:r>
+              <a:rPr lang="en-US" altLang="zh-CN"/>
+              <a:t>• (variable-&gt;assignment) replacing the value of a variable. </a:t>
+            </a:r>
           </a:p>
         </p:txBody>
       </p:sp>
     </p:spTree>
     <p:extLst>
       <p:ext uri="{BB962C8B-B14F-4D97-AF65-F5344CB8AC3E}">
-        <p14:creationId xmlns:p14="http://schemas.microsoft.com/office/powerpoint/2010/main" val="3685412025"/>
+        <p14:creationId xmlns:p14="http://schemas.microsoft.com/office/powerpoint/2010/main" val="92748445"/>
       </p:ext>
     </p:extLst>
   </p:cSld>
   <p:clrMapOvr>
     <a:masterClrMapping/>
   </p:clrMapOvr>
+  <p:timing>
+    <p:tnLst>
+      <p:par>
+        <p:cTn id="1" dur="indefinite" restart="never" nodeType="tmRoot"/>
+      </p:par>
+    </p:tnLst>
+  </p:timing>
 </p:sld>
 </file>
 
@@ -8112,10 +8584,214 @@
   <p:clrMapOvr>
     <a:masterClrMapping/>
   </p:clrMapOvr>
+  <p:timing>
+    <p:tnLst>
+      <p:par>
+        <p:cTn id="1" dur="indefinite" restart="never" nodeType="tmRoot"/>
+      </p:par>
+    </p:tnLst>
+  </p:timing>
 </p:sld>
 </file>
 
 <file path=ppt/slides/slide7.xml><?xml version="1.0" encoding="utf-8"?>
+<p:sld xmlns:a="http://schemas.openxmlformats.org/drawingml/2006/main" xmlns:r="http://schemas.openxmlformats.org/officeDocument/2006/relationships" xmlns:p="http://schemas.openxmlformats.org/presentationml/2006/main">
+  <p:cSld>
+    <p:spTree>
+      <p:nvGrpSpPr>
+        <p:cNvPr id="1" name=""/>
+        <p:cNvGrpSpPr/>
+        <p:nvPr/>
+      </p:nvGrpSpPr>
+      <p:grpSpPr>
+        <a:xfrm>
+          <a:off x="0" y="0"/>
+          <a:ext cx="0" cy="0"/>
+          <a:chOff x="0" y="0"/>
+          <a:chExt cx="0" cy="0"/>
+        </a:xfrm>
+      </p:grpSpPr>
+      <p:sp>
+        <p:nvSpPr>
+          <p:cNvPr id="4" name="Rectangle 3">
+            <a:hlinkClick r:id="rId2"/>
+          </p:cNvPr>
+          <p:cNvSpPr/>
+          <p:nvPr/>
+        </p:nvSpPr>
+        <p:spPr>
+          <a:xfrm>
+            <a:off x="685800" y="5715000"/>
+            <a:ext cx="7391400" cy="369332"/>
+          </a:xfrm>
+          <a:prstGeom prst="rect">
+            <a:avLst/>
+          </a:prstGeom>
+        </p:spPr>
+        <p:txBody>
+          <a:bodyPr wrap="square">
+            <a:spAutoFit/>
+          </a:bodyPr>
+          <a:lstStyle/>
+          <a:p>
+            <a:r>
+              <a:rPr lang="en-US" dirty="0">
+                <a:hlinkClick r:id="rId2"/>
+              </a:rPr>
+              <a:t>http://codurance.com/2015/05/12/does-tdd-lead-to-good-design/</a:t>
+            </a:r>
+            <a:endParaRPr lang="en-US" dirty="0"/>
+          </a:p>
+        </p:txBody>
+      </p:sp>
+      <p:sp>
+        <p:nvSpPr>
+          <p:cNvPr id="5" name="TextBox 4"/>
+          <p:cNvSpPr txBox="1"/>
+          <p:nvPr/>
+        </p:nvSpPr>
+        <p:spPr>
+          <a:xfrm>
+            <a:off x="533400" y="685800"/>
+            <a:ext cx="8305800" cy="4185761"/>
+          </a:xfrm>
+          <a:prstGeom prst="rect">
+            <a:avLst/>
+          </a:prstGeom>
+          <a:noFill/>
+        </p:spPr>
+        <p:txBody>
+          <a:bodyPr wrap="square" rtlCol="0">
+            <a:spAutoFit/>
+          </a:bodyPr>
+          <a:lstStyle/>
+          <a:p>
+            <a:r>
+              <a:rPr lang="en-US" sz="3200" dirty="0" smtClean="0"/>
+              <a:t>Classicist TDD</a:t>
+            </a:r>
+          </a:p>
+          <a:p>
+            <a:endParaRPr lang="en-US" dirty="0"/>
+          </a:p>
+          <a:p>
+            <a:pPr marL="342900" indent="-342900">
+              <a:buFont typeface="+mj-lt"/>
+              <a:buAutoNum type="arabicPeriod"/>
+            </a:pPr>
+            <a:r>
+              <a:rPr lang="en-US" dirty="0" smtClean="0"/>
+              <a:t>Design </a:t>
+            </a:r>
+            <a:r>
+              <a:rPr lang="en-US" dirty="0"/>
+              <a:t>happens during the refactoring phase.</a:t>
+            </a:r>
+          </a:p>
+          <a:p>
+            <a:pPr marL="342900" indent="-342900">
+              <a:buFont typeface="+mj-lt"/>
+              <a:buAutoNum type="arabicPeriod"/>
+            </a:pPr>
+            <a:r>
+              <a:rPr lang="en-US" dirty="0" smtClean="0"/>
+              <a:t>During </a:t>
+            </a:r>
+            <a:r>
+              <a:rPr lang="en-US" dirty="0"/>
+              <a:t>the refactoring phase, the unit under test may grow to multiple classes.</a:t>
+            </a:r>
+          </a:p>
+          <a:p>
+            <a:pPr marL="342900" indent="-342900">
+              <a:buFont typeface="+mj-lt"/>
+              <a:buAutoNum type="arabicPeriod"/>
+            </a:pPr>
+            <a:r>
+              <a:rPr lang="en-US" dirty="0"/>
+              <a:t>Mocks are rarely used, unless when isolating external systems.</a:t>
+            </a:r>
+          </a:p>
+          <a:p>
+            <a:pPr marL="342900" indent="-342900">
+              <a:buFont typeface="+mj-lt"/>
+              <a:buAutoNum type="arabicPeriod"/>
+            </a:pPr>
+            <a:r>
+              <a:rPr lang="en-US" dirty="0"/>
+              <a:t>No up-front design considerations are made. Design completely emerges from code.</a:t>
+            </a:r>
+          </a:p>
+          <a:p>
+            <a:pPr marL="342900" indent="-342900">
+              <a:buFont typeface="+mj-lt"/>
+              <a:buAutoNum type="arabicPeriod"/>
+            </a:pPr>
+            <a:r>
+              <a:rPr lang="en-US" dirty="0"/>
+              <a:t>It’s a great way to avoid over-engineering.</a:t>
+            </a:r>
+          </a:p>
+          <a:p>
+            <a:pPr marL="342900" indent="-342900">
+              <a:buFont typeface="+mj-lt"/>
+              <a:buAutoNum type="arabicPeriod"/>
+            </a:pPr>
+            <a:r>
+              <a:rPr lang="en-US" dirty="0" smtClean="0"/>
+              <a:t>Often </a:t>
+            </a:r>
+            <a:r>
+              <a:rPr lang="en-US" dirty="0"/>
+              <a:t>used in conjunction with the 4 Rules of Simple Design.</a:t>
+            </a:r>
+          </a:p>
+          <a:p>
+            <a:pPr marL="342900" indent="-342900">
+              <a:buFont typeface="+mj-lt"/>
+              <a:buAutoNum type="arabicPeriod"/>
+            </a:pPr>
+            <a:r>
+              <a:rPr lang="en-US" dirty="0"/>
+              <a:t>Good for exploration, when we know what the input and desired output are but we don’t really know how the implementation looks like.</a:t>
+            </a:r>
+          </a:p>
+          <a:p>
+            <a:pPr marL="342900" indent="-342900">
+              <a:buFont typeface="+mj-lt"/>
+              <a:buAutoNum type="arabicPeriod"/>
+            </a:pPr>
+            <a:r>
+              <a:rPr lang="en-US" dirty="0"/>
+              <a:t>Great for cases where we can’t rely on a domain expert or domain language (data transformation, algorithms, etc.)</a:t>
+            </a:r>
+          </a:p>
+          <a:p>
+            <a:endParaRPr lang="en-US" dirty="0"/>
+          </a:p>
+        </p:txBody>
+      </p:sp>
+    </p:spTree>
+    <p:extLst>
+      <p:ext uri="{BB962C8B-B14F-4D97-AF65-F5344CB8AC3E}">
+        <p14:creationId xmlns:p14="http://schemas.microsoft.com/office/powerpoint/2010/main" val="1321943776"/>
+      </p:ext>
+    </p:extLst>
+  </p:cSld>
+  <p:clrMapOvr>
+    <a:masterClrMapping/>
+  </p:clrMapOvr>
+  <p:timing>
+    <p:tnLst>
+      <p:par>
+        <p:cTn id="1" dur="indefinite" restart="never" nodeType="tmRoot"/>
+      </p:par>
+    </p:tnLst>
+  </p:timing>
+</p:sld>
+</file>
+
+<file path=ppt/slides/slide8.xml><?xml version="1.0" encoding="utf-8"?>
 <p:sld xmlns:a="http://schemas.openxmlformats.org/drawingml/2006/main" xmlns:r="http://schemas.openxmlformats.org/officeDocument/2006/relationships" xmlns:p="http://schemas.openxmlformats.org/presentationml/2006/main">
   <p:cSld>
     <p:spTree>
@@ -8140,8 +8816,205 @@
         </p:nvSpPr>
         <p:spPr>
           <a:xfrm>
-            <a:off x="1981200" y="2438400"/>
-            <a:ext cx="5551648" cy="1384995"/>
+            <a:off x="533400" y="685800"/>
+            <a:ext cx="7924800" cy="3908762"/>
+          </a:xfrm>
+          <a:prstGeom prst="rect">
+            <a:avLst/>
+          </a:prstGeom>
+          <a:noFill/>
+        </p:spPr>
+        <p:txBody>
+          <a:bodyPr wrap="square" rtlCol="0">
+            <a:spAutoFit/>
+          </a:bodyPr>
+          <a:lstStyle/>
+          <a:p>
+            <a:r>
+              <a:rPr lang="en-US" sz="3200" dirty="0" smtClean="0"/>
+              <a:t>Outside-In TDD</a:t>
+            </a:r>
+          </a:p>
+          <a:p>
+            <a:endParaRPr lang="en-US" dirty="0"/>
+          </a:p>
+          <a:p>
+            <a:pPr marL="342900" indent="-342900">
+              <a:buFont typeface="+mj-lt"/>
+              <a:buAutoNum type="arabicPeriod"/>
+            </a:pPr>
+            <a:r>
+              <a:rPr lang="en-US" dirty="0" smtClean="0"/>
+              <a:t>Prescribes </a:t>
+            </a:r>
+            <a:r>
+              <a:rPr lang="en-US" dirty="0"/>
+              <a:t>a direction in which we start test-driving our code: from </a:t>
+            </a:r>
+            <a:r>
+              <a:rPr lang="en-US" dirty="0" smtClean="0"/>
+              <a:t>outside </a:t>
+            </a:r>
+            <a:r>
+              <a:rPr lang="en-US" dirty="0"/>
+              <a:t>to the </a:t>
+            </a:r>
+            <a:r>
+              <a:rPr lang="en-US" dirty="0" smtClean="0"/>
+              <a:t>inside.</a:t>
+            </a:r>
+          </a:p>
+          <a:p>
+            <a:pPr marL="342900" indent="-342900">
+              <a:buFont typeface="+mj-lt"/>
+              <a:buAutoNum type="arabicPeriod"/>
+            </a:pPr>
+            <a:r>
+              <a:rPr lang="en-US" dirty="0"/>
+              <a:t>Design starts in the </a:t>
+            </a:r>
+            <a:r>
+              <a:rPr lang="en-US" i="1" dirty="0"/>
+              <a:t>red</a:t>
+            </a:r>
+            <a:r>
+              <a:rPr lang="en-US" dirty="0"/>
+              <a:t> phase, while writing the tests.</a:t>
+            </a:r>
+          </a:p>
+          <a:p>
+            <a:pPr marL="342900" indent="-342900">
+              <a:buFont typeface="+mj-lt"/>
+              <a:buAutoNum type="arabicPeriod"/>
+            </a:pPr>
+            <a:r>
+              <a:rPr lang="en-US" dirty="0"/>
+              <a:t>Design is refined during the </a:t>
+            </a:r>
+            <a:r>
+              <a:rPr lang="en-US" i="1" dirty="0"/>
+              <a:t>refactoring</a:t>
+            </a:r>
+            <a:r>
+              <a:rPr lang="en-US" dirty="0"/>
+              <a:t> phase</a:t>
+            </a:r>
+            <a:r>
+              <a:rPr lang="en-US" dirty="0" smtClean="0"/>
+              <a:t>.</a:t>
+            </a:r>
+            <a:endParaRPr lang="en-US" dirty="0"/>
+          </a:p>
+          <a:p>
+            <a:pPr marL="342900" indent="-342900">
+              <a:buFont typeface="+mj-lt"/>
+              <a:buAutoNum type="arabicPeriod"/>
+            </a:pPr>
+            <a:r>
+              <a:rPr lang="en-US" dirty="0"/>
+              <a:t>We normally start with an acceptance test which verifies if the feature as a whole works. </a:t>
+            </a:r>
+            <a:r>
+              <a:rPr lang="en-US" dirty="0" smtClean="0"/>
+              <a:t>With </a:t>
+            </a:r>
+            <a:r>
+              <a:rPr lang="en-US" dirty="0"/>
+              <a:t>a failing acceptance test informing why the feature is not yet </a:t>
+            </a:r>
+            <a:r>
+              <a:rPr lang="en-US" dirty="0" smtClean="0"/>
+              <a:t>complete. we </a:t>
+            </a:r>
+            <a:r>
+              <a:rPr lang="en-US" dirty="0"/>
+              <a:t>start writing unit tests. </a:t>
+            </a:r>
+            <a:endParaRPr lang="en-US" dirty="0" smtClean="0"/>
+          </a:p>
+          <a:p>
+            <a:pPr marL="342900" indent="-342900">
+              <a:buFont typeface="+mj-lt"/>
+              <a:buAutoNum type="arabicPeriod"/>
+            </a:pPr>
+            <a:r>
+              <a:rPr lang="en-US" dirty="0" smtClean="0"/>
+              <a:t>Starts </a:t>
+            </a:r>
+            <a:r>
+              <a:rPr lang="en-US" dirty="0"/>
+              <a:t>from classes that are closer to the input of the system (outside) and move towards the inside of our application </a:t>
+            </a:r>
+            <a:endParaRPr lang="en-US" dirty="0" smtClean="0"/>
+          </a:p>
+          <a:p>
+            <a:pPr marL="342900" indent="-342900">
+              <a:buFont typeface="+mj-lt"/>
+              <a:buAutoNum type="arabicPeriod"/>
+            </a:pPr>
+            <a:r>
+              <a:rPr lang="en-US" dirty="0" smtClean="0"/>
+              <a:t>Refactoring </a:t>
+            </a:r>
+            <a:r>
+              <a:rPr lang="en-US" dirty="0"/>
+              <a:t>phases are much smaller, when compared to the classicist approach</a:t>
+            </a:r>
+            <a:r>
+              <a:rPr lang="en-US" dirty="0" smtClean="0"/>
+              <a:t>.</a:t>
+            </a:r>
+            <a:endParaRPr lang="en-US" dirty="0"/>
+          </a:p>
+        </p:txBody>
+      </p:sp>
+    </p:spTree>
+    <p:extLst>
+      <p:ext uri="{BB962C8B-B14F-4D97-AF65-F5344CB8AC3E}">
+        <p14:creationId xmlns:p14="http://schemas.microsoft.com/office/powerpoint/2010/main" val="314860247"/>
+      </p:ext>
+    </p:extLst>
+  </p:cSld>
+  <p:clrMapOvr>
+    <a:masterClrMapping/>
+  </p:clrMapOvr>
+  <p:timing>
+    <p:tnLst>
+      <p:par>
+        <p:cTn id="1" dur="indefinite" restart="never" nodeType="tmRoot"/>
+      </p:par>
+    </p:tnLst>
+  </p:timing>
+</p:sld>
+</file>
+
+<file path=ppt/slides/slide9.xml><?xml version="1.0" encoding="utf-8"?>
+<p:sld xmlns:a="http://schemas.openxmlformats.org/drawingml/2006/main" xmlns:r="http://schemas.openxmlformats.org/officeDocument/2006/relationships" xmlns:p="http://schemas.openxmlformats.org/presentationml/2006/main">
+  <p:cSld>
+    <p:spTree>
+      <p:nvGrpSpPr>
+        <p:cNvPr id="1" name=""/>
+        <p:cNvGrpSpPr/>
+        <p:nvPr/>
+      </p:nvGrpSpPr>
+      <p:grpSpPr>
+        <a:xfrm>
+          <a:off x="0" y="0"/>
+          <a:ext cx="0" cy="0"/>
+          <a:chOff x="0" y="0"/>
+          <a:chExt cx="0" cy="0"/>
+        </a:xfrm>
+      </p:grpSpPr>
+      <p:sp>
+        <p:nvSpPr>
+          <p:cNvPr id="2" name="TextBox 1"/>
+          <p:cNvSpPr txBox="1"/>
+          <p:nvPr/>
+        </p:nvSpPr>
+        <p:spPr>
+          <a:xfrm>
+            <a:off x="1904999" y="2035452"/>
+            <a:ext cx="5034263" cy="769441"/>
           </a:xfrm>
           <a:prstGeom prst="rect">
             <a:avLst/>
@@ -8155,35 +9028,156 @@
           <a:lstStyle/>
           <a:p>
             <a:r>
-              <a:rPr lang="en-US" sz="2800" dirty="0" smtClean="0"/>
-              <a:t>What scenarios can TDD be used in? </a:t>
-            </a:r>
-          </a:p>
-          <a:p>
-            <a:r>
-              <a:rPr lang="en-US" sz="2800" dirty="0" smtClean="0"/>
-              <a:t>What *Not*? </a:t>
-            </a:r>
-          </a:p>
-          <a:p>
-            <a:r>
-              <a:rPr lang="en-US" sz="2800" dirty="0" smtClean="0"/>
-              <a:t>If *Not*, what do we do?</a:t>
-            </a:r>
-            <a:endParaRPr lang="en-US" sz="2800" dirty="0"/>
+              <a:rPr lang="en-US" sz="4400" dirty="0" smtClean="0"/>
+              <a:t>Which One Is Better?</a:t>
+            </a:r>
+            <a:endParaRPr lang="en-US" sz="4400" dirty="0"/>
+          </a:p>
+        </p:txBody>
+      </p:sp>
+      <p:sp>
+        <p:nvSpPr>
+          <p:cNvPr id="3" name="TextBox 2"/>
+          <p:cNvSpPr txBox="1"/>
+          <p:nvPr/>
+        </p:nvSpPr>
+        <p:spPr>
+          <a:xfrm>
+            <a:off x="2209800" y="3429000"/>
+            <a:ext cx="4114800" cy="1200329"/>
+          </a:xfrm>
+          <a:prstGeom prst="rect">
+            <a:avLst/>
+          </a:prstGeom>
+          <a:noFill/>
+        </p:spPr>
+        <p:txBody>
+          <a:bodyPr wrap="square" rtlCol="0">
+            <a:spAutoFit/>
+          </a:bodyPr>
+          <a:lstStyle/>
+          <a:p>
+            <a:pPr algn="ctr"/>
+            <a:r>
+              <a:rPr lang="en-US" sz="2400" dirty="0"/>
+              <a:t>TDD becomes much easier when we understand what </a:t>
+            </a:r>
+            <a:r>
+              <a:rPr lang="en-US" sz="2400" dirty="0">
+                <a:solidFill>
+                  <a:srgbClr val="FF0000"/>
+                </a:solidFill>
+              </a:rPr>
+              <a:t>good design</a:t>
+            </a:r>
+            <a:r>
+              <a:rPr lang="en-US" sz="2400" dirty="0"/>
+              <a:t> looks </a:t>
+            </a:r>
+            <a:r>
+              <a:rPr lang="en-US" sz="2400" dirty="0" smtClean="0"/>
+              <a:t>like.</a:t>
+            </a:r>
+            <a:endParaRPr lang="en-US" sz="2400" dirty="0"/>
           </a:p>
         </p:txBody>
       </p:sp>
     </p:spTree>
     <p:extLst>
       <p:ext uri="{BB962C8B-B14F-4D97-AF65-F5344CB8AC3E}">
-        <p14:creationId xmlns:p14="http://schemas.microsoft.com/office/powerpoint/2010/main" val="1321943776"/>
+        <p14:creationId xmlns:p14="http://schemas.microsoft.com/office/powerpoint/2010/main" val="557968879"/>
       </p:ext>
     </p:extLst>
   </p:cSld>
   <p:clrMapOvr>
     <a:masterClrMapping/>
   </p:clrMapOvr>
+  <p:timing>
+    <p:tnLst>
+      <p:par>
+        <p:cTn id="1" dur="indefinite" restart="never" nodeType="tmRoot">
+          <p:childTnLst>
+            <p:seq concurrent="1" nextAc="seek">
+              <p:cTn id="2" dur="indefinite" nodeType="mainSeq">
+                <p:childTnLst>
+                  <p:par>
+                    <p:cTn id="3" fill="hold">
+                      <p:stCondLst>
+                        <p:cond delay="indefinite"/>
+                      </p:stCondLst>
+                      <p:childTnLst>
+                        <p:par>
+                          <p:cTn id="4" fill="hold">
+                            <p:stCondLst>
+                              <p:cond delay="0"/>
+                            </p:stCondLst>
+                            <p:childTnLst>
+                              <p:par>
+                                <p:cTn id="5" presetID="10" presetClass="entr" presetSubtype="0" fill="hold" grpId="0" nodeType="clickEffect">
+                                  <p:stCondLst>
+                                    <p:cond delay="0"/>
+                                  </p:stCondLst>
+                                  <p:childTnLst>
+                                    <p:set>
+                                      <p:cBhvr>
+                                        <p:cTn id="6" dur="1" fill="hold">
+                                          <p:stCondLst>
+                                            <p:cond delay="0"/>
+                                          </p:stCondLst>
+                                        </p:cTn>
+                                        <p:tgtEl>
+                                          <p:spTgt spid="3"/>
+                                        </p:tgtEl>
+                                        <p:attrNameLst>
+                                          <p:attrName>style.visibility</p:attrName>
+                                        </p:attrNameLst>
+                                      </p:cBhvr>
+                                      <p:to>
+                                        <p:strVal val="visible"/>
+                                      </p:to>
+                                    </p:set>
+                                    <p:animEffect transition="in" filter="fade">
+                                      <p:cBhvr>
+                                        <p:cTn id="7" dur="500"/>
+                                        <p:tgtEl>
+                                          <p:spTgt spid="3"/>
+                                        </p:tgtEl>
+                                      </p:cBhvr>
+                                    </p:animEffect>
+                                  </p:childTnLst>
+                                </p:cTn>
+                              </p:par>
+                            </p:childTnLst>
+                          </p:cTn>
+                        </p:par>
+                      </p:childTnLst>
+                    </p:cTn>
+                  </p:par>
+                </p:childTnLst>
+              </p:cTn>
+              <p:prevCondLst>
+                <p:cond evt="onPrev" delay="0">
+                  <p:tgtEl>
+                    <p:sldTgt/>
+                  </p:tgtEl>
+                </p:cond>
+              </p:prevCondLst>
+              <p:nextCondLst>
+                <p:cond evt="onNext" delay="0">
+                  <p:tgtEl>
+                    <p:sldTgt/>
+                  </p:tgtEl>
+                </p:cond>
+              </p:nextCondLst>
+            </p:seq>
+          </p:childTnLst>
+        </p:cTn>
+      </p:par>
+    </p:tnLst>
+    <p:bldLst>
+      <p:bldP spid="3" grpId="0"/>
+    </p:bldLst>
+  </p:timing>
 </p:sld>
 </file>
 

</xml_diff>

<commit_message>
add good design guideline
</commit_message>
<xml_diff>
--- a/Documents/TDD Hands-On 1 .pptx
+++ b/Documents/TDD Hands-On 1 .pptx
@@ -14,8 +14,9 @@
     <p:sldId id="260" r:id="rId8"/>
     <p:sldId id="264" r:id="rId9"/>
     <p:sldId id="266" r:id="rId10"/>
-    <p:sldId id="262" r:id="rId11"/>
-    <p:sldId id="265" r:id="rId12"/>
+    <p:sldId id="267" r:id="rId11"/>
+    <p:sldId id="262" r:id="rId12"/>
+    <p:sldId id="265" r:id="rId13"/>
   </p:sldIdLst>
   <p:sldSz cx="9144000" cy="6858000" type="screen4x3"/>
   <p:notesSz cx="6858000" cy="9144000"/>
@@ -7594,6 +7595,267 @@
         </p:nvSpPr>
         <p:spPr>
           <a:xfrm>
+            <a:off x="1143000" y="1142999"/>
+            <a:ext cx="4254691" cy="3631763"/>
+          </a:xfrm>
+          <a:prstGeom prst="rect">
+            <a:avLst/>
+          </a:prstGeom>
+          <a:noFill/>
+        </p:spPr>
+        <p:txBody>
+          <a:bodyPr wrap="none" rtlCol="0">
+            <a:spAutoFit/>
+          </a:bodyPr>
+          <a:lstStyle/>
+          <a:p>
+            <a:r>
+              <a:rPr lang="en-US" sz="3200" dirty="0" smtClean="0"/>
+              <a:t>Good Design Guidelines </a:t>
+            </a:r>
+          </a:p>
+          <a:p>
+            <a:endParaRPr lang="en-US" dirty="0"/>
+          </a:p>
+          <a:p>
+            <a:pPr marL="342900" indent="-342900">
+              <a:buFont typeface="+mj-lt"/>
+              <a:buAutoNum type="arabicPeriod"/>
+            </a:pPr>
+            <a:r>
+              <a:rPr lang="en-US" dirty="0" smtClean="0">
+                <a:hlinkClick r:id="rId2"/>
+              </a:rPr>
+              <a:t>4 </a:t>
+            </a:r>
+            <a:r>
+              <a:rPr lang="en-US" dirty="0">
+                <a:hlinkClick r:id="rId2"/>
+              </a:rPr>
+              <a:t>Rules of Simple </a:t>
+            </a:r>
+            <a:r>
+              <a:rPr lang="en-US" dirty="0" smtClean="0">
+                <a:hlinkClick r:id="rId2"/>
+              </a:rPr>
+              <a:t>Design</a:t>
+            </a:r>
+            <a:endParaRPr lang="en-US" dirty="0" smtClean="0"/>
+          </a:p>
+          <a:p>
+            <a:pPr marL="342900" indent="-342900">
+              <a:buFont typeface="+mj-lt"/>
+              <a:buAutoNum type="arabicPeriod"/>
+            </a:pPr>
+            <a:r>
+              <a:rPr lang="en-US" dirty="0" smtClean="0">
+                <a:hlinkClick r:id="rId3"/>
+              </a:rPr>
+              <a:t>Domain </a:t>
+            </a:r>
+            <a:r>
+              <a:rPr lang="en-US" dirty="0">
+                <a:hlinkClick r:id="rId3"/>
+              </a:rPr>
+              <a:t>Driven </a:t>
+            </a:r>
+            <a:r>
+              <a:rPr lang="en-US" dirty="0" smtClean="0">
+                <a:hlinkClick r:id="rId3"/>
+              </a:rPr>
+              <a:t>Design</a:t>
+            </a:r>
+            <a:endParaRPr lang="en-US" dirty="0" smtClean="0"/>
+          </a:p>
+          <a:p>
+            <a:pPr marL="342900" indent="-342900">
+              <a:buFont typeface="+mj-lt"/>
+              <a:buAutoNum type="arabicPeriod"/>
+            </a:pPr>
+            <a:r>
+              <a:rPr lang="en-US" dirty="0" smtClean="0">
+                <a:hlinkClick r:id="rId4"/>
+              </a:rPr>
+              <a:t>SOLID</a:t>
+            </a:r>
+            <a:endParaRPr lang="en-US" dirty="0" smtClean="0"/>
+          </a:p>
+          <a:p>
+            <a:pPr marL="342900" indent="-342900">
+              <a:buFont typeface="+mj-lt"/>
+              <a:buAutoNum type="arabicPeriod"/>
+            </a:pPr>
+            <a:r>
+              <a:rPr lang="en-US" dirty="0" smtClean="0"/>
+              <a:t>Patterns</a:t>
+            </a:r>
+          </a:p>
+          <a:p>
+            <a:pPr marL="342900" indent="-342900">
+              <a:buFont typeface="+mj-lt"/>
+              <a:buAutoNum type="arabicPeriod"/>
+            </a:pPr>
+            <a:r>
+              <a:rPr lang="en-US" dirty="0" smtClean="0">
+                <a:hlinkClick r:id="rId5"/>
+              </a:rPr>
+              <a:t>Law </a:t>
+            </a:r>
+            <a:r>
+              <a:rPr lang="en-US" dirty="0">
+                <a:hlinkClick r:id="rId5"/>
+              </a:rPr>
+              <a:t>of </a:t>
+            </a:r>
+            <a:r>
+              <a:rPr lang="en-US" dirty="0" smtClean="0">
+                <a:hlinkClick r:id="rId5"/>
+              </a:rPr>
+              <a:t>Demeter</a:t>
+            </a:r>
+            <a:endParaRPr lang="en-US" dirty="0" smtClean="0"/>
+          </a:p>
+          <a:p>
+            <a:pPr marL="342900" indent="-342900">
+              <a:buFont typeface="+mj-lt"/>
+              <a:buAutoNum type="arabicPeriod"/>
+            </a:pPr>
+            <a:r>
+              <a:rPr lang="en-US" dirty="0" smtClean="0">
+                <a:hlinkClick r:id="rId6"/>
+              </a:rPr>
+              <a:t>Tell </a:t>
+            </a:r>
+            <a:r>
+              <a:rPr lang="en-US" dirty="0">
+                <a:hlinkClick r:id="rId6"/>
+              </a:rPr>
+              <a:t>Don’t </a:t>
+            </a:r>
+            <a:r>
+              <a:rPr lang="en-US" dirty="0" smtClean="0">
+                <a:hlinkClick r:id="rId6"/>
+              </a:rPr>
+              <a:t>Ask</a:t>
+            </a:r>
+            <a:endParaRPr lang="en-US" dirty="0" smtClean="0"/>
+          </a:p>
+          <a:p>
+            <a:pPr marL="342900" indent="-342900">
+              <a:buFont typeface="+mj-lt"/>
+              <a:buAutoNum type="arabicPeriod"/>
+            </a:pPr>
+            <a:r>
+              <a:rPr lang="en-US" dirty="0" smtClean="0">
+                <a:hlinkClick r:id="rId7"/>
+              </a:rPr>
+              <a:t>Design </a:t>
+            </a:r>
+            <a:r>
+              <a:rPr lang="en-US" dirty="0">
+                <a:hlinkClick r:id="rId7"/>
+              </a:rPr>
+              <a:t>by </a:t>
+            </a:r>
+            <a:r>
+              <a:rPr lang="en-US" dirty="0" smtClean="0">
+                <a:hlinkClick r:id="rId7"/>
+              </a:rPr>
+              <a:t>Contract</a:t>
+            </a:r>
+            <a:endParaRPr lang="en-US" dirty="0" smtClean="0"/>
+          </a:p>
+          <a:p>
+            <a:pPr marL="342900" indent="-342900">
+              <a:buFont typeface="+mj-lt"/>
+              <a:buAutoNum type="arabicPeriod"/>
+            </a:pPr>
+            <a:r>
+              <a:rPr lang="en-US" dirty="0" smtClean="0">
+                <a:hlinkClick r:id="rId8"/>
+              </a:rPr>
+              <a:t>Feature Envy</a:t>
+            </a:r>
+            <a:endParaRPr lang="en-US" dirty="0" smtClean="0"/>
+          </a:p>
+          <a:p>
+            <a:pPr marL="342900" indent="-342900">
+              <a:buFont typeface="+mj-lt"/>
+              <a:buAutoNum type="arabicPeriod"/>
+            </a:pPr>
+            <a:r>
+              <a:rPr lang="en-US" dirty="0" smtClean="0">
+                <a:hlinkClick r:id="rId9"/>
+              </a:rPr>
+              <a:t>Cohesion and Coupling</a:t>
+            </a:r>
+            <a:endParaRPr lang="en-US" dirty="0" smtClean="0"/>
+          </a:p>
+          <a:p>
+            <a:pPr marL="342900" indent="-342900">
+              <a:buFont typeface="+mj-lt"/>
+              <a:buAutoNum type="arabicPeriod"/>
+            </a:pPr>
+            <a:r>
+              <a:rPr lang="en-US" dirty="0" smtClean="0">
+                <a:hlinkClick r:id="rId10"/>
+              </a:rPr>
+              <a:t>Balanced </a:t>
+            </a:r>
+            <a:r>
+              <a:rPr lang="en-US" dirty="0">
+                <a:hlinkClick r:id="rId10"/>
+              </a:rPr>
+              <a:t>Abstraction </a:t>
+            </a:r>
+            <a:r>
+              <a:rPr lang="en-US" dirty="0" smtClean="0">
+                <a:hlinkClick r:id="rId10"/>
+              </a:rPr>
+              <a:t>Principle</a:t>
+            </a:r>
+            <a:endParaRPr lang="en-US" dirty="0" smtClean="0"/>
+          </a:p>
+        </p:txBody>
+      </p:sp>
+    </p:spTree>
+    <p:extLst>
+      <p:ext uri="{BB962C8B-B14F-4D97-AF65-F5344CB8AC3E}">
+        <p14:creationId xmlns:p14="http://schemas.microsoft.com/office/powerpoint/2010/main" val="2017735004"/>
+      </p:ext>
+    </p:extLst>
+  </p:cSld>
+  <p:clrMapOvr>
+    <a:masterClrMapping/>
+  </p:clrMapOvr>
+</p:sld>
+</file>
+
+<file path=ppt/slides/slide11.xml><?xml version="1.0" encoding="utf-8"?>
+<p:sld xmlns:a="http://schemas.openxmlformats.org/drawingml/2006/main" xmlns:r="http://schemas.openxmlformats.org/officeDocument/2006/relationships" xmlns:p="http://schemas.openxmlformats.org/presentationml/2006/main">
+  <p:cSld>
+    <p:spTree>
+      <p:nvGrpSpPr>
+        <p:cNvPr id="1" name=""/>
+        <p:cNvGrpSpPr/>
+        <p:nvPr/>
+      </p:nvGrpSpPr>
+      <p:grpSpPr>
+        <a:xfrm>
+          <a:off x="0" y="0"/>
+          <a:ext cx="0" cy="0"/>
+          <a:chOff x="0" y="0"/>
+          <a:chExt cx="0" cy="0"/>
+        </a:xfrm>
+      </p:grpSpPr>
+      <p:sp>
+        <p:nvSpPr>
+          <p:cNvPr id="2" name="TextBox 1"/>
+          <p:cNvSpPr txBox="1"/>
+          <p:nvPr/>
+        </p:nvSpPr>
+        <p:spPr>
+          <a:xfrm>
             <a:off x="1752600" y="2209800"/>
             <a:ext cx="5181483" cy="2431435"/>
           </a:xfrm>
@@ -7749,7 +8011,7 @@
 </p:sld>
 </file>
 
-<file path=ppt/slides/slide11.xml><?xml version="1.0" encoding="utf-8"?>
+<file path=ppt/slides/slide12.xml><?xml version="1.0" encoding="utf-8"?>
 <p:sld xmlns:a="http://schemas.openxmlformats.org/drawingml/2006/main" xmlns:r="http://schemas.openxmlformats.org/officeDocument/2006/relationships" xmlns:p="http://schemas.openxmlformats.org/presentationml/2006/main">
   <p:cSld>
     <p:spTree>

</xml_diff>